<commit_message>
small fixes to lecture #1
</commit_message>
<xml_diff>
--- a/classes/prog2018/Prog3-Lecture01.pptx
+++ b/classes/prog2018/Prog3-Lecture01.pptx
@@ -188,10 +188,6 @@
 </p:presentation>
 </file>
 
-<file path=ppt/revisionInfo.xml><?xml version="1.0" encoding="utf-8"?>
-<p1510:revInfo xmlns:a="http://schemas.openxmlformats.org/drawingml/2006/main" xmlns:r="http://schemas.openxmlformats.org/officeDocument/2006/relationships" xmlns:p1510="http://schemas.microsoft.com/office/powerpoint/2015/10/main"/>
-</file>
-
 <file path=ppt/notesMasters/notesMaster1.xml><?xml version="1.0" encoding="utf-8"?>
 <p:notesMaster xmlns:a="http://schemas.openxmlformats.org/drawingml/2006/main" xmlns:r="http://schemas.openxmlformats.org/officeDocument/2006/relationships" xmlns:p="http://schemas.openxmlformats.org/presentationml/2006/main">
   <p:cSld>
@@ -275,7 +271,7 @@
             <a:fld id="{B59E3D86-40EF-4699-B290-9A90C971F488}" type="datetimeFigureOut">
               <a:rPr lang="en-US" smtClean="0"/>
               <a:pPr/>
-              <a:t>8/18/2018</a:t>
+              <a:t>8/21/2018</a:t>
             </a:fld>
             <a:endParaRPr lang="en-US"/>
           </a:p>
@@ -4738,7 +4734,7 @@
             <a:fld id="{1D8BD707-D9CF-40AE-B4C6-C98DA3205C09}" type="datetimeFigureOut">
               <a:rPr lang="en-US" smtClean="0"/>
               <a:pPr/>
-              <a:t>8/18/2018</a:t>
+              <a:t>8/21/2018</a:t>
             </a:fld>
             <a:endParaRPr lang="en-US"/>
           </a:p>
@@ -4903,7 +4899,7 @@
             <a:fld id="{1D8BD707-D9CF-40AE-B4C6-C98DA3205C09}" type="datetimeFigureOut">
               <a:rPr lang="en-US" smtClean="0"/>
               <a:pPr/>
-              <a:t>8/18/2018</a:t>
+              <a:t>8/21/2018</a:t>
             </a:fld>
             <a:endParaRPr lang="en-US"/>
           </a:p>
@@ -5078,7 +5074,7 @@
             <a:fld id="{1D8BD707-D9CF-40AE-B4C6-C98DA3205C09}" type="datetimeFigureOut">
               <a:rPr lang="en-US" smtClean="0"/>
               <a:pPr/>
-              <a:t>8/18/2018</a:t>
+              <a:t>8/21/2018</a:t>
             </a:fld>
             <a:endParaRPr lang="en-US"/>
           </a:p>
@@ -5243,7 +5239,7 @@
             <a:fld id="{1D8BD707-D9CF-40AE-B4C6-C98DA3205C09}" type="datetimeFigureOut">
               <a:rPr lang="en-US" smtClean="0"/>
               <a:pPr/>
-              <a:t>8/18/2018</a:t>
+              <a:t>8/21/2018</a:t>
             </a:fld>
             <a:endParaRPr lang="en-US"/>
           </a:p>
@@ -5485,7 +5481,7 @@
             <a:fld id="{1D8BD707-D9CF-40AE-B4C6-C98DA3205C09}" type="datetimeFigureOut">
               <a:rPr lang="en-US" smtClean="0"/>
               <a:pPr/>
-              <a:t>8/18/2018</a:t>
+              <a:t>8/21/2018</a:t>
             </a:fld>
             <a:endParaRPr lang="en-US"/>
           </a:p>
@@ -5767,7 +5763,7 @@
             <a:fld id="{1D8BD707-D9CF-40AE-B4C6-C98DA3205C09}" type="datetimeFigureOut">
               <a:rPr lang="en-US" smtClean="0"/>
               <a:pPr/>
-              <a:t>8/18/2018</a:t>
+              <a:t>8/21/2018</a:t>
             </a:fld>
             <a:endParaRPr lang="en-US"/>
           </a:p>
@@ -6183,7 +6179,7 @@
             <a:fld id="{1D8BD707-D9CF-40AE-B4C6-C98DA3205C09}" type="datetimeFigureOut">
               <a:rPr lang="en-US" smtClean="0"/>
               <a:pPr/>
-              <a:t>8/18/2018</a:t>
+              <a:t>8/21/2018</a:t>
             </a:fld>
             <a:endParaRPr lang="en-US"/>
           </a:p>
@@ -6297,7 +6293,7 @@
             <a:fld id="{1D8BD707-D9CF-40AE-B4C6-C98DA3205C09}" type="datetimeFigureOut">
               <a:rPr lang="en-US" smtClean="0"/>
               <a:pPr/>
-              <a:t>8/18/2018</a:t>
+              <a:t>8/21/2018</a:t>
             </a:fld>
             <a:endParaRPr lang="en-US"/>
           </a:p>
@@ -6389,7 +6385,7 @@
             <a:fld id="{1D8BD707-D9CF-40AE-B4C6-C98DA3205C09}" type="datetimeFigureOut">
               <a:rPr lang="en-US" smtClean="0"/>
               <a:pPr/>
-              <a:t>8/18/2018</a:t>
+              <a:t>8/21/2018</a:t>
             </a:fld>
             <a:endParaRPr lang="en-US"/>
           </a:p>
@@ -6661,7 +6657,7 @@
             <a:fld id="{1D8BD707-D9CF-40AE-B4C6-C98DA3205C09}" type="datetimeFigureOut">
               <a:rPr lang="en-US" smtClean="0"/>
               <a:pPr/>
-              <a:t>8/18/2018</a:t>
+              <a:t>8/21/2018</a:t>
             </a:fld>
             <a:endParaRPr lang="en-US"/>
           </a:p>
@@ -6910,7 +6906,7 @@
             <a:fld id="{1D8BD707-D9CF-40AE-B4C6-C98DA3205C09}" type="datetimeFigureOut">
               <a:rPr lang="en-US" smtClean="0"/>
               <a:pPr/>
-              <a:t>8/18/2018</a:t>
+              <a:t>8/21/2018</a:t>
             </a:fld>
             <a:endParaRPr lang="en-US"/>
           </a:p>
@@ -7118,7 +7114,7 @@
             <a:fld id="{1D8BD707-D9CF-40AE-B4C6-C98DA3205C09}" type="datetimeFigureOut">
               <a:rPr lang="en-US" smtClean="0"/>
               <a:pPr/>
-              <a:t>8/18/2018</a:t>
+              <a:t>8/21/2018</a:t>
             </a:fld>
             <a:endParaRPr lang="en-US"/>
           </a:p>
@@ -7597,13 +7593,6 @@
   <p:clrMapOvr>
     <a:masterClrMapping/>
   </p:clrMapOvr>
-  <p:timing>
-    <p:tnLst>
-      <p:par>
-        <p:cTn id="1" dur="indefinite" restart="never" nodeType="tmRoot"/>
-      </p:par>
-    </p:tnLst>
-  </p:timing>
 </p:sld>
 </file>
 
@@ -7725,13 +7714,6 @@
   <p:clrMapOvr>
     <a:masterClrMapping/>
   </p:clrMapOvr>
-  <p:timing>
-    <p:tnLst>
-      <p:par>
-        <p:cTn id="1" dur="indefinite" restart="never" nodeType="tmRoot"/>
-      </p:par>
-    </p:tnLst>
-  </p:timing>
 </p:sld>
 </file>
 
@@ -7789,13 +7771,6 @@
   <p:clrMapOvr>
     <a:masterClrMapping/>
   </p:clrMapOvr>
-  <p:timing>
-    <p:tnLst>
-      <p:par>
-        <p:cTn id="1" dur="indefinite" restart="never" nodeType="tmRoot"/>
-      </p:par>
-    </p:tnLst>
-  </p:timing>
 </p:sld>
 </file>
 
@@ -7949,13 +7924,6 @@
   <p:clrMapOvr>
     <a:masterClrMapping/>
   </p:clrMapOvr>
-  <p:timing>
-    <p:tnLst>
-      <p:par>
-        <p:cTn id="1" dur="indefinite" restart="never" nodeType="tmRoot"/>
-      </p:par>
-    </p:tnLst>
-  </p:timing>
 </p:sld>
 </file>
 
@@ -8099,13 +8067,6 @@
   <p:clrMapOvr>
     <a:masterClrMapping/>
   </p:clrMapOvr>
-  <p:timing>
-    <p:tnLst>
-      <p:par>
-        <p:cTn id="1" dur="indefinite" restart="never" nodeType="tmRoot"/>
-      </p:par>
-    </p:tnLst>
-  </p:timing>
 </p:sld>
 </file>
 
@@ -8258,13 +8219,6 @@
   <p:clrMapOvr>
     <a:masterClrMapping/>
   </p:clrMapOvr>
-  <p:timing>
-    <p:tnLst>
-      <p:par>
-        <p:cTn id="1" dur="indefinite" restart="never" nodeType="tmRoot"/>
-      </p:par>
-    </p:tnLst>
-  </p:timing>
 </p:sld>
 </file>
 
@@ -8382,13 +8336,6 @@
   <p:clrMapOvr>
     <a:masterClrMapping/>
   </p:clrMapOvr>
-  <p:timing>
-    <p:tnLst>
-      <p:par>
-        <p:cTn id="1" dur="indefinite" restart="never" nodeType="tmRoot"/>
-      </p:par>
-    </p:tnLst>
-  </p:timing>
 </p:sld>
 </file>
 
@@ -8446,13 +8393,6 @@
   <p:clrMapOvr>
     <a:masterClrMapping/>
   </p:clrMapOvr>
-  <p:timing>
-    <p:tnLst>
-      <p:par>
-        <p:cTn id="1" dur="indefinite" restart="never" nodeType="tmRoot"/>
-      </p:par>
-    </p:tnLst>
-  </p:timing>
 </p:sld>
 </file>
 
@@ -8473,12 +8413,70 @@
           <a:chExt cx="0" cy="0"/>
         </a:xfrm>
       </p:grpSpPr>
+      <p:sp>
+        <p:nvSpPr>
+          <p:cNvPr id="4" name="TextBox 3"/>
+          <p:cNvSpPr txBox="1"/>
+          <p:nvPr/>
+        </p:nvSpPr>
+        <p:spPr>
+          <a:xfrm>
+            <a:off x="762000" y="6172200"/>
+            <a:ext cx="5506123" cy="369332"/>
+          </a:xfrm>
+          <a:prstGeom prst="rect">
+            <a:avLst/>
+          </a:prstGeom>
+          <a:noFill/>
+        </p:spPr>
+        <p:txBody>
+          <a:bodyPr wrap="none" rtlCol="0">
+            <a:spAutoFit/>
+          </a:bodyPr>
+          <a:lstStyle/>
+          <a:p>
+            <a:r>
+              <a:rPr lang="en-US" dirty="0"/>
+              <a:t>http://afodor.github.io/classes/prog2018/prog2018.html</a:t>
+            </a:r>
+          </a:p>
+        </p:txBody>
+      </p:sp>
+      <p:sp>
+        <p:nvSpPr>
+          <p:cNvPr id="5" name="TextBox 4"/>
+          <p:cNvSpPr txBox="1"/>
+          <p:nvPr/>
+        </p:nvSpPr>
+        <p:spPr>
+          <a:xfrm>
+            <a:off x="762000" y="392668"/>
+            <a:ext cx="5506123" cy="369332"/>
+          </a:xfrm>
+          <a:prstGeom prst="rect">
+            <a:avLst/>
+          </a:prstGeom>
+          <a:noFill/>
+        </p:spPr>
+        <p:txBody>
+          <a:bodyPr wrap="none" rtlCol="0">
+            <a:spAutoFit/>
+          </a:bodyPr>
+          <a:lstStyle/>
+          <a:p>
+            <a:r>
+              <a:rPr lang="en-US" dirty="0"/>
+              <a:t>http://afodor.github.io/classes/prog2018/prog2018.html</a:t>
+            </a:r>
+          </a:p>
+        </p:txBody>
+      </p:sp>
       <p:pic>
         <p:nvPicPr>
-          <p:cNvPr id="2" name="Picture 1">
+          <p:cNvPr id="3" name="Picture 2">
             <a:extLst>
               <a:ext uri="{FF2B5EF4-FFF2-40B4-BE49-F238E27FC236}">
-                <a16:creationId xmlns:a16="http://schemas.microsoft.com/office/drawing/2014/main" id="{8CB37F55-250C-4BEA-B2F8-B3A9076D6ACE}"/>
+                <a16:creationId xmlns:a16="http://schemas.microsoft.com/office/drawing/2014/main" id="{30EDA158-3620-48BB-BE3F-2967033013B3}"/>
               </a:ext>
             </a:extLst>
           </p:cNvPr>
@@ -8495,94 +8493,19 @@
         </p:blipFill>
         <p:spPr>
           <a:xfrm>
-            <a:off x="0" y="899688"/>
-            <a:ext cx="9144000" cy="5058624"/>
+            <a:off x="1104900" y="1052512"/>
+            <a:ext cx="6934200" cy="4752975"/>
           </a:xfrm>
           <a:prstGeom prst="rect">
             <a:avLst/>
           </a:prstGeom>
         </p:spPr>
       </p:pic>
-      <p:sp>
-        <p:nvSpPr>
-          <p:cNvPr id="4" name="TextBox 3"/>
-          <p:cNvSpPr txBox="1"/>
-          <p:nvPr/>
-        </p:nvSpPr>
-        <p:spPr>
-          <a:xfrm>
-            <a:off x="762000" y="6172200"/>
-            <a:ext cx="5506123" cy="369332"/>
-          </a:xfrm>
-          <a:prstGeom prst="rect">
-            <a:avLst/>
-          </a:prstGeom>
-          <a:noFill/>
-        </p:spPr>
-        <p:txBody>
-          <a:bodyPr wrap="none" rtlCol="0">
-            <a:spAutoFit/>
-          </a:bodyPr>
-          <a:lstStyle/>
-          <a:p>
-            <a:r>
-              <a:rPr lang="en-US" dirty="0"/>
-              <a:t>http://</a:t>
-            </a:r>
-            <a:r>
-              <a:rPr lang="en-US" dirty="0" smtClean="0"/>
-              <a:t>afodor.github.io/classes/prog2018/prog2018.html</a:t>
-            </a:r>
-            <a:endParaRPr lang="en-US" dirty="0"/>
-          </a:p>
-        </p:txBody>
-      </p:sp>
-      <p:sp>
-        <p:nvSpPr>
-          <p:cNvPr id="5" name="TextBox 4"/>
-          <p:cNvSpPr txBox="1"/>
-          <p:nvPr/>
-        </p:nvSpPr>
-        <p:spPr>
-          <a:xfrm>
-            <a:off x="762000" y="392668"/>
-            <a:ext cx="5506123" cy="369332"/>
-          </a:xfrm>
-          <a:prstGeom prst="rect">
-            <a:avLst/>
-          </a:prstGeom>
-          <a:noFill/>
-        </p:spPr>
-        <p:txBody>
-          <a:bodyPr wrap="none" rtlCol="0">
-            <a:spAutoFit/>
-          </a:bodyPr>
-          <a:lstStyle/>
-          <a:p>
-            <a:r>
-              <a:rPr lang="en-US" dirty="0"/>
-              <a:t>http://</a:t>
-            </a:r>
-            <a:r>
-              <a:rPr lang="en-US" dirty="0" smtClean="0"/>
-              <a:t>afodor.github.io/classes/prog2018/prog2018.html</a:t>
-            </a:r>
-            <a:endParaRPr lang="en-US" dirty="0"/>
-          </a:p>
-        </p:txBody>
-      </p:sp>
     </p:spTree>
   </p:cSld>
   <p:clrMapOvr>
     <a:masterClrMapping/>
   </p:clrMapOvr>
-  <p:timing>
-    <p:tnLst>
-      <p:par>
-        <p:cTn id="1" dur="indefinite" restart="never" nodeType="tmRoot"/>
-      </p:par>
-    </p:tnLst>
-  </p:timing>
 </p:sld>
 </file>
 
@@ -8682,13 +8605,6 @@
   <p:clrMapOvr>
     <a:masterClrMapping/>
   </p:clrMapOvr>
-  <p:timing>
-    <p:tnLst>
-      <p:par>
-        <p:cTn id="1" dur="indefinite" restart="never" nodeType="tmRoot"/>
-      </p:par>
-    </p:tnLst>
-  </p:timing>
 </p:sld>
 </file>
 
@@ -8777,13 +8693,6 @@
   <p:clrMapOvr>
     <a:masterClrMapping/>
   </p:clrMapOvr>
-  <p:timing>
-    <p:tnLst>
-      <p:par>
-        <p:cTn id="1" dur="indefinite" restart="never" nodeType="tmRoot"/>
-      </p:par>
-    </p:tnLst>
-  </p:timing>
 </p:sld>
 </file>
 
@@ -8833,13 +8742,6 @@
   <p:clrMapOvr>
     <a:masterClrMapping/>
   </p:clrMapOvr>
-  <p:timing>
-    <p:tnLst>
-      <p:par>
-        <p:cTn id="1" dur="indefinite" restart="never" nodeType="tmRoot"/>
-      </p:par>
-    </p:tnLst>
-  </p:timing>
 </p:sld>
 </file>
 
@@ -8957,13 +8859,6 @@
   <p:clrMapOvr>
     <a:masterClrMapping/>
   </p:clrMapOvr>
-  <p:timing>
-    <p:tnLst>
-      <p:par>
-        <p:cTn id="1" dur="indefinite" restart="never" nodeType="tmRoot"/>
-      </p:par>
-    </p:tnLst>
-  </p:timing>
 </p:sld>
 </file>
 
@@ -9083,13 +8978,6 @@
   <p:clrMapOvr>
     <a:masterClrMapping/>
   </p:clrMapOvr>
-  <p:timing>
-    <p:tnLst>
-      <p:par>
-        <p:cTn id="1" dur="indefinite" restart="never" nodeType="tmRoot"/>
-      </p:par>
-    </p:tnLst>
-  </p:timing>
 </p:sld>
 </file>
 
@@ -9211,13 +9099,6 @@
   <p:clrMapOvr>
     <a:masterClrMapping/>
   </p:clrMapOvr>
-  <p:timing>
-    <p:tnLst>
-      <p:par>
-        <p:cTn id="1" dur="indefinite" restart="never" nodeType="tmRoot"/>
-      </p:par>
-    </p:tnLst>
-  </p:timing>
 </p:sld>
 </file>
 
@@ -9356,13 +9237,6 @@
   <p:clrMapOvr>
     <a:masterClrMapping/>
   </p:clrMapOvr>
-  <p:timing>
-    <p:tnLst>
-      <p:par>
-        <p:cTn id="1" dur="indefinite" restart="never" nodeType="tmRoot"/>
-      </p:par>
-    </p:tnLst>
-  </p:timing>
 </p:sld>
 </file>
 
@@ -9988,13 +9862,6 @@
   <p:clrMapOvr>
     <a:masterClrMapping/>
   </p:clrMapOvr>
-  <p:timing>
-    <p:tnLst>
-      <p:par>
-        <p:cTn id="1" dur="indefinite" restart="never" nodeType="tmRoot"/>
-      </p:par>
-    </p:tnLst>
-  </p:timing>
 </p:sld>
 </file>
 
@@ -10484,13 +10351,6 @@
   <p:clrMapOvr>
     <a:masterClrMapping/>
   </p:clrMapOvr>
-  <p:timing>
-    <p:tnLst>
-      <p:par>
-        <p:cTn id="1" dur="indefinite" restart="never" nodeType="tmRoot"/>
-      </p:par>
-    </p:tnLst>
-  </p:timing>
 </p:sld>
 </file>
 
@@ -10659,13 +10519,6 @@
   <p:clrMapOvr>
     <a:masterClrMapping/>
   </p:clrMapOvr>
-  <p:timing>
-    <p:tnLst>
-      <p:par>
-        <p:cTn id="1" dur="indefinite" restart="never" nodeType="tmRoot"/>
-      </p:par>
-    </p:tnLst>
-  </p:timing>
 </p:sld>
 </file>
 
@@ -10752,13 +10605,6 @@
   <p:clrMapOvr>
     <a:masterClrMapping/>
   </p:clrMapOvr>
-  <p:timing>
-    <p:tnLst>
-      <p:par>
-        <p:cTn id="1" dur="indefinite" restart="never" nodeType="tmRoot"/>
-      </p:par>
-    </p:tnLst>
-  </p:timing>
 </p:sld>
 </file>
 
@@ -10894,13 +10740,6 @@
   <p:clrMapOvr>
     <a:masterClrMapping/>
   </p:clrMapOvr>
-  <p:timing>
-    <p:tnLst>
-      <p:par>
-        <p:cTn id="1" dur="indefinite" restart="never" nodeType="tmRoot"/>
-      </p:par>
-    </p:tnLst>
-  </p:timing>
 </p:sld>
 </file>
 
@@ -10958,13 +10797,6 @@
   <p:clrMapOvr>
     <a:masterClrMapping/>
   </p:clrMapOvr>
-  <p:timing>
-    <p:tnLst>
-      <p:par>
-        <p:cTn id="1" dur="indefinite" restart="never" nodeType="tmRoot"/>
-      </p:par>
-    </p:tnLst>
-  </p:timing>
 </p:sld>
 </file>
 
@@ -11059,13 +10891,6 @@
   <p:clrMapOvr>
     <a:masterClrMapping/>
   </p:clrMapOvr>
-  <p:timing>
-    <p:tnLst>
-      <p:par>
-        <p:cTn id="1" dur="indefinite" restart="never" nodeType="tmRoot"/>
-      </p:par>
-    </p:tnLst>
-  </p:timing>
 </p:sld>
 </file>
 
@@ -11126,13 +10951,6 @@
   <p:clrMapOvr>
     <a:masterClrMapping/>
   </p:clrMapOvr>
-  <p:timing>
-    <p:tnLst>
-      <p:par>
-        <p:cTn id="1" dur="indefinite" restart="never" nodeType="tmRoot"/>
-      </p:par>
-    </p:tnLst>
-  </p:timing>
 </p:sld>
 </file>
 
@@ -11232,13 +11050,6 @@
   <p:clrMapOvr>
     <a:masterClrMapping/>
   </p:clrMapOvr>
-  <p:timing>
-    <p:tnLst>
-      <p:par>
-        <p:cTn id="1" dur="indefinite" restart="never" nodeType="tmRoot"/>
-      </p:par>
-    </p:tnLst>
-  </p:timing>
 </p:sld>
 </file>
 
@@ -11486,13 +11297,6 @@
   <p:clrMapOvr>
     <a:masterClrMapping/>
   </p:clrMapOvr>
-  <p:timing>
-    <p:tnLst>
-      <p:par>
-        <p:cTn id="1" dur="indefinite" restart="never" nodeType="tmRoot"/>
-      </p:par>
-    </p:tnLst>
-  </p:timing>
 </p:sld>
 </file>
 
@@ -11911,13 +11715,6 @@
   <p:clrMapOvr>
     <a:masterClrMapping/>
   </p:clrMapOvr>
-  <p:timing>
-    <p:tnLst>
-      <p:par>
-        <p:cTn id="1" dur="indefinite" restart="never" nodeType="tmRoot"/>
-      </p:par>
-    </p:tnLst>
-  </p:timing>
 </p:sld>
 </file>
 
@@ -12004,13 +11801,6 @@
   <p:clrMapOvr>
     <a:masterClrMapping/>
   </p:clrMapOvr>
-  <p:timing>
-    <p:tnLst>
-      <p:par>
-        <p:cTn id="1" dur="indefinite" restart="never" nodeType="tmRoot"/>
-      </p:par>
-    </p:tnLst>
-  </p:timing>
 </p:sld>
 </file>
 
@@ -12158,13 +11948,6 @@
   <p:clrMapOvr>
     <a:masterClrMapping/>
   </p:clrMapOvr>
-  <p:timing>
-    <p:tnLst>
-      <p:par>
-        <p:cTn id="1" dur="indefinite" restart="never" nodeType="tmRoot"/>
-      </p:par>
-    </p:tnLst>
-  </p:timing>
 </p:sld>
 </file>
 
@@ -12280,13 +12063,6 @@
   <p:clrMapOvr>
     <a:masterClrMapping/>
   </p:clrMapOvr>
-  <p:timing>
-    <p:tnLst>
-      <p:par>
-        <p:cTn id="1" dur="indefinite" restart="never" nodeType="tmRoot"/>
-      </p:par>
-    </p:tnLst>
-  </p:timing>
 </p:sld>
 </file>
 
@@ -12407,13 +12183,6 @@
   <p:clrMapOvr>
     <a:masterClrMapping/>
   </p:clrMapOvr>
-  <p:timing>
-    <p:tnLst>
-      <p:par>
-        <p:cTn id="1" dur="indefinite" restart="never" nodeType="tmRoot"/>
-      </p:par>
-    </p:tnLst>
-  </p:timing>
 </p:sld>
 </file>
 
@@ -12568,13 +12337,6 @@
   <p:clrMapOvr>
     <a:masterClrMapping/>
   </p:clrMapOvr>
-  <p:timing>
-    <p:tnLst>
-      <p:par>
-        <p:cTn id="1" dur="indefinite" restart="never" nodeType="tmRoot"/>
-      </p:par>
-    </p:tnLst>
-  </p:timing>
 </p:sld>
 </file>
 
@@ -13156,10 +12918,9 @@
           <a:lstStyle/>
           <a:p>
             <a:r>
-              <a:rPr lang="en-US" dirty="0" smtClean="0"/>
+              <a:rPr lang="en-US" dirty="0"/>
               <a:t>D3, data visualization, React</a:t>
             </a:r>
-            <a:endParaRPr lang="en-US" dirty="0"/>
           </a:p>
         </p:txBody>
       </p:sp>
@@ -13360,13 +13121,6 @@
   <p:clrMapOvr>
     <a:masterClrMapping/>
   </p:clrMapOvr>
-  <p:timing>
-    <p:tnLst>
-      <p:par>
-        <p:cTn id="1" dur="indefinite" restart="never" nodeType="tmRoot"/>
-      </p:par>
-    </p:tnLst>
-  </p:timing>
 </p:sld>
 </file>
 
@@ -13558,13 +13312,6 @@
   <p:clrMapOvr>
     <a:masterClrMapping/>
   </p:clrMapOvr>
-  <p:timing>
-    <p:tnLst>
-      <p:par>
-        <p:cTn id="1" dur="indefinite" restart="never" nodeType="tmRoot"/>
-      </p:par>
-    </p:tnLst>
-  </p:timing>
 </p:sld>
 </file>
 
@@ -13796,13 +13543,6 @@
   <p:clrMapOvr>
     <a:masterClrMapping/>
   </p:clrMapOvr>
-  <p:timing>
-    <p:tnLst>
-      <p:par>
-        <p:cTn id="1" dur="indefinite" restart="never" nodeType="tmRoot"/>
-      </p:par>
-    </p:tnLst>
-  </p:timing>
 </p:sld>
 </file>
 
@@ -13958,13 +13698,6 @@
   <p:clrMapOvr>
     <a:masterClrMapping/>
   </p:clrMapOvr>
-  <p:timing>
-    <p:tnLst>
-      <p:par>
-        <p:cTn id="1" dur="indefinite" restart="never" nodeType="tmRoot"/>
-      </p:par>
-    </p:tnLst>
-  </p:timing>
 </p:sld>
 </file>
 
@@ -14008,12 +13741,8 @@
           <a:lstStyle/>
           <a:p>
             <a:r>
-              <a:rPr lang="en-US" dirty="0" smtClean="0"/>
-              <a:t>Right now (or at home): try </a:t>
-            </a:r>
-            <a:r>
-              <a:rPr lang="en-US" dirty="0"/>
-              <a:t>and type in compile and run a HelloWorld.java program</a:t>
+              <a:rPr lang="en-US" dirty="0"/>
+              <a:t>Right now (or at home): try and type in compile and run a HelloWorld.java program</a:t>
             </a:r>
           </a:p>
         </p:txBody>
@@ -14055,13 +13784,6 @@
   <p:clrMapOvr>
     <a:masterClrMapping/>
   </p:clrMapOvr>
-  <p:timing>
-    <p:tnLst>
-      <p:par>
-        <p:cTn id="1" dur="indefinite" restart="never" nodeType="tmRoot"/>
-      </p:par>
-    </p:tnLst>
-  </p:timing>
 </p:sld>
 </file>
 
@@ -14518,15 +14240,7 @@
           <a:p>
             <a:r>
               <a:rPr lang="en-US" dirty="0"/>
-              <a:t>The object oriented approach is to try and </a:t>
-            </a:r>
-            <a:r>
-              <a:rPr lang="en-US" dirty="0" err="1"/>
-              <a:t>encapsalate</a:t>
-            </a:r>
-            <a:r>
-              <a:rPr lang="en-US" dirty="0"/>
-              <a:t> </a:t>
+              <a:t>The object oriented approach is to try and encapsulate </a:t>
             </a:r>
             <a:r>
               <a:rPr lang="en-US" dirty="0" err="1"/>
@@ -15259,13 +14973,6 @@
   <p:clrMapOvr>
     <a:masterClrMapping/>
   </p:clrMapOvr>
-  <p:timing>
-    <p:tnLst>
-      <p:par>
-        <p:cTn id="1" dur="indefinite" restart="never" nodeType="tmRoot"/>
-      </p:par>
-    </p:tnLst>
-  </p:timing>
 </p:sld>
 </file>
 
@@ -19121,13 +18828,6 @@
   <p:clrMapOvr>
     <a:masterClrMapping/>
   </p:clrMapOvr>
-  <p:timing>
-    <p:tnLst>
-      <p:par>
-        <p:cTn id="1" dur="indefinite" restart="never" nodeType="tmRoot"/>
-      </p:par>
-    </p:tnLst>
-  </p:timing>
 </p:sld>
 </file>
 
@@ -20082,13 +19782,6 @@
   <p:clrMapOvr>
     <a:masterClrMapping/>
   </p:clrMapOvr>
-  <p:timing>
-    <p:tnLst>
-      <p:par>
-        <p:cTn id="1" dur="indefinite" restart="never" nodeType="tmRoot"/>
-      </p:par>
-    </p:tnLst>
-  </p:timing>
 </p:sld>
 </file>
 
@@ -20143,13 +19836,6 @@
   <p:clrMapOvr>
     <a:masterClrMapping/>
   </p:clrMapOvr>
-  <p:timing>
-    <p:tnLst>
-      <p:par>
-        <p:cTn id="1" dur="indefinite" restart="never" nodeType="tmRoot"/>
-      </p:par>
-    </p:tnLst>
-  </p:timing>
 </p:sld>
 </file>
 
@@ -20330,13 +20016,6 @@
   <p:clrMapOvr>
     <a:masterClrMapping/>
   </p:clrMapOvr>
-  <p:timing>
-    <p:tnLst>
-      <p:par>
-        <p:cTn id="1" dur="indefinite" restart="never" nodeType="tmRoot"/>
-      </p:par>
-    </p:tnLst>
-  </p:timing>
 </p:sld>
 </file>
 

</xml_diff>